<commit_message>
25/8 Docx updates & CSS updates
</commit_message>
<xml_diff>
--- a/PowerPoints/WireFrames.pptx
+++ b/PowerPoints/WireFrames.pptx
@@ -107,6 +107,11 @@
       </a:defRPr>
     </a:lvl9pPr>
   </p:defaultTextStyle>
+  <p:extLst>
+    <p:ext uri="{EFAFB233-063F-42B5-8137-9DF3F51BA10A}">
+      <p15:sldGuideLst xmlns:p15="http://schemas.microsoft.com/office/powerpoint/2012/main"/>
+    </p:ext>
+  </p:extLst>
 </p:presentation>
 </file>
 
@@ -2211,7 +2216,7 @@
           <a:p>
             <a:fld id="{59AD6ED2-06E5-413B-A705-7AEAA10694DC}" type="datetimeFigureOut">
               <a:rPr lang="he-IL" smtClean="0"/>
-              <a:t>כ"ג/אב/תשפ"ב</a:t>
+              <a:t>כ"ד/אב/תשפ"ב</a:t>
             </a:fld>
             <a:endParaRPr lang="he-IL"/>
           </a:p>
@@ -2411,7 +2416,7 @@
           <a:p>
             <a:fld id="{59AD6ED2-06E5-413B-A705-7AEAA10694DC}" type="datetimeFigureOut">
               <a:rPr lang="he-IL" smtClean="0"/>
-              <a:t>כ"ג/אב/תשפ"ב</a:t>
+              <a:t>כ"ד/אב/תשפ"ב</a:t>
             </a:fld>
             <a:endParaRPr lang="he-IL"/>
           </a:p>
@@ -2621,7 +2626,7 @@
           <a:p>
             <a:fld id="{59AD6ED2-06E5-413B-A705-7AEAA10694DC}" type="datetimeFigureOut">
               <a:rPr lang="he-IL" smtClean="0"/>
-              <a:t>כ"ג/אב/תשפ"ב</a:t>
+              <a:t>כ"ד/אב/תשפ"ב</a:t>
             </a:fld>
             <a:endParaRPr lang="he-IL"/>
           </a:p>
@@ -2821,7 +2826,7 @@
           <a:p>
             <a:fld id="{59AD6ED2-06E5-413B-A705-7AEAA10694DC}" type="datetimeFigureOut">
               <a:rPr lang="he-IL" smtClean="0"/>
-              <a:t>כ"ג/אב/תשפ"ב</a:t>
+              <a:t>כ"ד/אב/תשפ"ב</a:t>
             </a:fld>
             <a:endParaRPr lang="he-IL"/>
           </a:p>
@@ -3097,7 +3102,7 @@
           <a:p>
             <a:fld id="{59AD6ED2-06E5-413B-A705-7AEAA10694DC}" type="datetimeFigureOut">
               <a:rPr lang="he-IL" smtClean="0"/>
-              <a:t>כ"ג/אב/תשפ"ב</a:t>
+              <a:t>כ"ד/אב/תשפ"ב</a:t>
             </a:fld>
             <a:endParaRPr lang="he-IL"/>
           </a:p>
@@ -3365,7 +3370,7 @@
           <a:p>
             <a:fld id="{59AD6ED2-06E5-413B-A705-7AEAA10694DC}" type="datetimeFigureOut">
               <a:rPr lang="he-IL" smtClean="0"/>
-              <a:t>כ"ג/אב/תשפ"ב</a:t>
+              <a:t>כ"ד/אב/תשפ"ב</a:t>
             </a:fld>
             <a:endParaRPr lang="he-IL"/>
           </a:p>
@@ -3780,7 +3785,7 @@
           <a:p>
             <a:fld id="{59AD6ED2-06E5-413B-A705-7AEAA10694DC}" type="datetimeFigureOut">
               <a:rPr lang="he-IL" smtClean="0"/>
-              <a:t>כ"ג/אב/תשפ"ב</a:t>
+              <a:t>כ"ד/אב/תשפ"ב</a:t>
             </a:fld>
             <a:endParaRPr lang="he-IL"/>
           </a:p>
@@ -3922,7 +3927,7 @@
           <a:p>
             <a:fld id="{59AD6ED2-06E5-413B-A705-7AEAA10694DC}" type="datetimeFigureOut">
               <a:rPr lang="he-IL" smtClean="0"/>
-              <a:t>כ"ג/אב/תשפ"ב</a:t>
+              <a:t>כ"ד/אב/תשפ"ב</a:t>
             </a:fld>
             <a:endParaRPr lang="he-IL"/>
           </a:p>
@@ -4035,7 +4040,7 @@
           <a:p>
             <a:fld id="{59AD6ED2-06E5-413B-A705-7AEAA10694DC}" type="datetimeFigureOut">
               <a:rPr lang="he-IL" smtClean="0"/>
-              <a:t>כ"ג/אב/תשפ"ב</a:t>
+              <a:t>כ"ד/אב/תשפ"ב</a:t>
             </a:fld>
             <a:endParaRPr lang="he-IL"/>
           </a:p>
@@ -4348,7 +4353,7 @@
           <a:p>
             <a:fld id="{59AD6ED2-06E5-413B-A705-7AEAA10694DC}" type="datetimeFigureOut">
               <a:rPr lang="he-IL" smtClean="0"/>
-              <a:t>כ"ג/אב/תשפ"ב</a:t>
+              <a:t>כ"ד/אב/תשפ"ב</a:t>
             </a:fld>
             <a:endParaRPr lang="he-IL"/>
           </a:p>
@@ -4637,7 +4642,7 @@
           <a:p>
             <a:fld id="{59AD6ED2-06E5-413B-A705-7AEAA10694DC}" type="datetimeFigureOut">
               <a:rPr lang="he-IL" smtClean="0"/>
-              <a:t>כ"ג/אב/תשפ"ב</a:t>
+              <a:t>כ"ד/אב/תשפ"ב</a:t>
             </a:fld>
             <a:endParaRPr lang="he-IL"/>
           </a:p>
@@ -4880,7 +4885,7 @@
           <a:p>
             <a:fld id="{59AD6ED2-06E5-413B-A705-7AEAA10694DC}" type="datetimeFigureOut">
               <a:rPr lang="he-IL" smtClean="0"/>
-              <a:t>כ"ג/אב/תשפ"ב</a:t>
+              <a:t>כ"ד/אב/תשפ"ב</a:t>
             </a:fld>
             <a:endParaRPr lang="he-IL"/>
           </a:p>
@@ -5311,9 +5316,9 @@
         </p:nvGrpSpPr>
         <p:grpSpPr>
           <a:xfrm>
-            <a:off x="-1" y="-158115"/>
+            <a:off x="-1" y="-129540"/>
             <a:ext cx="12213433" cy="8018780"/>
-            <a:chOff x="-1" y="-158115"/>
+            <a:chOff x="-1" y="-129540"/>
             <a:chExt cx="12213433" cy="8018780"/>
           </a:xfrm>
         </p:grpSpPr>
@@ -5404,7 +5409,7 @@
           </p:blipFill>
           <p:spPr bwMode="auto">
             <a:xfrm>
-              <a:off x="945931" y="-158115"/>
+              <a:off x="936406" y="-129540"/>
               <a:ext cx="10874057" cy="8018780"/>
             </a:xfrm>
             <a:prstGeom prst="rect">
@@ -9577,312 +9582,56 @@
           <a:chExt cx="0" cy="0"/>
         </a:xfrm>
       </p:grpSpPr>
-      <p:grpSp>
-        <p:nvGrpSpPr>
-          <p:cNvPr id="12" name="Group 11">
+      <p:pic>
+        <p:nvPicPr>
+          <p:cNvPr id="2" name="Picture 1">
             <a:extLst>
               <a:ext uri="{FF2B5EF4-FFF2-40B4-BE49-F238E27FC236}">
-                <a16:creationId xmlns:a16="http://schemas.microsoft.com/office/drawing/2014/main" id="{8E22876C-47D6-2BED-0A9B-5A3856298691}"/>
+                <a16:creationId xmlns:a16="http://schemas.microsoft.com/office/drawing/2014/main" id="{2EAB1266-063A-1052-784C-4C6C91DD8F80}"/>
               </a:ext>
             </a:extLst>
           </p:cNvPr>
-          <p:cNvGrpSpPr/>
+          <p:cNvPicPr>
+            <a:picLocks noChangeAspect="1"/>
+          </p:cNvPicPr>
           <p:nvPr/>
-        </p:nvGrpSpPr>
-        <p:grpSpPr>
+        </p:nvPicPr>
+        <p:blipFill>
+          <a:blip r:embed="rId2">
+            <a:extLst>
+              <a:ext uri="{BEBA8EAE-BF5A-486C-A8C5-ECC9F3942E4B}">
+                <a14:imgProps xmlns:a14="http://schemas.microsoft.com/office/drawing/2010/main">
+                  <a14:imgLayer r:embed="rId3">
+                    <a14:imgEffect>
+                      <a14:backgroundRemoval t="10000" b="90000" l="5417" r="96607"/>
+                    </a14:imgEffect>
+                  </a14:imgLayer>
+                </a14:imgProps>
+              </a:ext>
+              <a:ext uri="{28A0092B-C50C-407E-A947-70E740481C1C}">
+                <a14:useLocalDpi xmlns:a14="http://schemas.microsoft.com/office/drawing/2010/main" val="0"/>
+              </a:ext>
+            </a:extLst>
+          </a:blip>
+          <a:srcRect/>
+          <a:stretch>
+            <a:fillRect/>
+          </a:stretch>
+        </p:blipFill>
+        <p:spPr bwMode="auto">
           <a:xfrm>
-            <a:off x="3898900" y="952500"/>
-            <a:ext cx="3670300" cy="2679700"/>
-            <a:chOff x="3898900" y="952500"/>
-            <a:chExt cx="3670300" cy="2679700"/>
+            <a:off x="-442913" y="-681991"/>
+            <a:ext cx="13077825" cy="9643890"/>
           </a:xfrm>
-        </p:grpSpPr>
-        <p:sp>
-          <p:nvSpPr>
-            <p:cNvPr id="4" name="Rectangle: Rounded Corners 3">
-              <a:extLst>
-                <a:ext uri="{FF2B5EF4-FFF2-40B4-BE49-F238E27FC236}">
-                  <a16:creationId xmlns:a16="http://schemas.microsoft.com/office/drawing/2014/main" id="{3177FBEC-28F6-66BA-ED83-E7D7BD9BDEFE}"/>
-                </a:ext>
-              </a:extLst>
-            </p:cNvPr>
-            <p:cNvSpPr/>
-            <p:nvPr/>
-          </p:nvSpPr>
-          <p:spPr>
-            <a:xfrm>
-              <a:off x="3898900" y="952500"/>
-              <a:ext cx="3670300" cy="2679700"/>
-            </a:xfrm>
-            <a:prstGeom prst="roundRect">
-              <a:avLst/>
-            </a:prstGeom>
-            <a:solidFill>
-              <a:schemeClr val="bg1">
-                <a:lumMod val="75000"/>
-              </a:schemeClr>
-            </a:solidFill>
-          </p:spPr>
-          <p:style>
-            <a:lnRef idx="2">
-              <a:schemeClr val="accent1">
-                <a:shade val="50000"/>
-              </a:schemeClr>
-            </a:lnRef>
-            <a:fillRef idx="1">
-              <a:schemeClr val="accent1"/>
-            </a:fillRef>
-            <a:effectRef idx="0">
-              <a:schemeClr val="accent1"/>
-            </a:effectRef>
-            <a:fontRef idx="minor">
-              <a:schemeClr val="lt1"/>
-            </a:fontRef>
-          </p:style>
-          <p:txBody>
-            <a:bodyPr rtlCol="1" anchor="ctr"/>
-            <a:lstStyle/>
-            <a:p>
-              <a:pPr algn="ctr"/>
-              <a:endParaRPr lang="he-IL"/>
-            </a:p>
-          </p:txBody>
-        </p:sp>
-        <p:cxnSp>
-          <p:nvCxnSpPr>
-            <p:cNvPr id="6" name="Straight Arrow Connector 5">
-              <a:extLst>
-                <a:ext uri="{FF2B5EF4-FFF2-40B4-BE49-F238E27FC236}">
-                  <a16:creationId xmlns:a16="http://schemas.microsoft.com/office/drawing/2014/main" id="{DB051EC6-2459-7289-66CE-F806DE8553C1}"/>
-                </a:ext>
-              </a:extLst>
-            </p:cNvPr>
-            <p:cNvCxnSpPr/>
-            <p:nvPr/>
-          </p:nvCxnSpPr>
-          <p:spPr>
-            <a:xfrm>
-              <a:off x="4508500" y="1892300"/>
-              <a:ext cx="977900" cy="0"/>
-            </a:xfrm>
-            <a:prstGeom prst="straightConnector1">
-              <a:avLst/>
-            </a:prstGeom>
-            <a:ln>
-              <a:solidFill>
-                <a:srgbClr val="FFFF00"/>
-              </a:solidFill>
-              <a:tailEnd type="triangle"/>
-            </a:ln>
-          </p:spPr>
-          <p:style>
-            <a:lnRef idx="1">
-              <a:schemeClr val="accent1"/>
-            </a:lnRef>
-            <a:fillRef idx="0">
-              <a:schemeClr val="accent1"/>
-            </a:fillRef>
-            <a:effectRef idx="0">
-              <a:schemeClr val="accent1"/>
-            </a:effectRef>
-            <a:fontRef idx="minor">
-              <a:schemeClr val="tx1"/>
-            </a:fontRef>
-          </p:style>
-        </p:cxnSp>
-        <p:cxnSp>
-          <p:nvCxnSpPr>
-            <p:cNvPr id="7" name="Straight Arrow Connector 6">
-              <a:extLst>
-                <a:ext uri="{FF2B5EF4-FFF2-40B4-BE49-F238E27FC236}">
-                  <a16:creationId xmlns:a16="http://schemas.microsoft.com/office/drawing/2014/main" id="{1858AA32-E8C8-E9AC-47FC-672A7680559C}"/>
-                </a:ext>
-              </a:extLst>
-            </p:cNvPr>
-            <p:cNvCxnSpPr/>
-            <p:nvPr/>
-          </p:nvCxnSpPr>
-          <p:spPr>
-            <a:xfrm>
-              <a:off x="4508500" y="1333500"/>
-              <a:ext cx="977900" cy="0"/>
-            </a:xfrm>
-            <a:prstGeom prst="straightConnector1">
-              <a:avLst/>
-            </a:prstGeom>
-            <a:ln>
-              <a:solidFill>
-                <a:srgbClr val="FF0000"/>
-              </a:solidFill>
-              <a:tailEnd type="triangle"/>
-            </a:ln>
-          </p:spPr>
-          <p:style>
-            <a:lnRef idx="1">
-              <a:schemeClr val="accent1"/>
-            </a:lnRef>
-            <a:fillRef idx="0">
-              <a:schemeClr val="accent1"/>
-            </a:fillRef>
-            <a:effectRef idx="0">
-              <a:schemeClr val="accent1"/>
-            </a:effectRef>
-            <a:fontRef idx="minor">
-              <a:schemeClr val="tx1"/>
-            </a:fontRef>
-          </p:style>
-        </p:cxnSp>
-        <p:cxnSp>
-          <p:nvCxnSpPr>
-            <p:cNvPr id="8" name="Straight Arrow Connector 7">
-              <a:extLst>
-                <a:ext uri="{FF2B5EF4-FFF2-40B4-BE49-F238E27FC236}">
-                  <a16:creationId xmlns:a16="http://schemas.microsoft.com/office/drawing/2014/main" id="{5636B2A3-BE1B-4FA9-B512-AAA462915B15}"/>
-                </a:ext>
-              </a:extLst>
-            </p:cNvPr>
-            <p:cNvCxnSpPr/>
-            <p:nvPr/>
-          </p:nvCxnSpPr>
-          <p:spPr>
-            <a:xfrm>
-              <a:off x="4508500" y="2514600"/>
-              <a:ext cx="977900" cy="0"/>
-            </a:xfrm>
-            <a:prstGeom prst="straightConnector1">
-              <a:avLst/>
-            </a:prstGeom>
-            <a:ln>
-              <a:solidFill>
-                <a:srgbClr val="00B050"/>
-              </a:solidFill>
-              <a:tailEnd type="triangle"/>
-            </a:ln>
-          </p:spPr>
-          <p:style>
-            <a:lnRef idx="1">
-              <a:schemeClr val="accent1"/>
-            </a:lnRef>
-            <a:fillRef idx="0">
-              <a:schemeClr val="accent1"/>
-            </a:fillRef>
-            <a:effectRef idx="0">
-              <a:schemeClr val="accent1"/>
-            </a:effectRef>
-            <a:fontRef idx="minor">
-              <a:schemeClr val="tx1"/>
-            </a:fontRef>
-          </p:style>
-        </p:cxnSp>
-        <p:sp>
-          <p:nvSpPr>
-            <p:cNvPr id="9" name="TextBox 8">
-              <a:extLst>
-                <a:ext uri="{FF2B5EF4-FFF2-40B4-BE49-F238E27FC236}">
-                  <a16:creationId xmlns:a16="http://schemas.microsoft.com/office/drawing/2014/main" id="{13804051-3186-1159-B322-53BF675F617D}"/>
-                </a:ext>
-              </a:extLst>
-            </p:cNvPr>
-            <p:cNvSpPr txBox="1"/>
-            <p:nvPr/>
-          </p:nvSpPr>
-          <p:spPr>
-            <a:xfrm>
-              <a:off x="5727700" y="1148834"/>
-              <a:ext cx="1600200" cy="369332"/>
-            </a:xfrm>
-            <a:prstGeom prst="rect">
-              <a:avLst/>
-            </a:prstGeom>
+          <a:prstGeom prst="rect">
+            <a:avLst/>
+          </a:prstGeom>
+          <a:noFill/>
+          <a:ln>
             <a:noFill/>
-          </p:spPr>
-          <p:txBody>
-            <a:bodyPr wrap="square" rtlCol="1">
-              <a:spAutoFit/>
-            </a:bodyPr>
-            <a:lstStyle/>
-            <a:p>
-              <a:r>
-                <a:rPr lang="en-US" dirty="0"/>
-                <a:t>Change Page</a:t>
-              </a:r>
-              <a:endParaRPr lang="he-IL" dirty="0"/>
-            </a:p>
-          </p:txBody>
-        </p:sp>
-        <p:sp>
-          <p:nvSpPr>
-            <p:cNvPr id="10" name="TextBox 9">
-              <a:extLst>
-                <a:ext uri="{FF2B5EF4-FFF2-40B4-BE49-F238E27FC236}">
-                  <a16:creationId xmlns:a16="http://schemas.microsoft.com/office/drawing/2014/main" id="{A9E06AD3-A987-94E0-B024-10E07550670B}"/>
-                </a:ext>
-              </a:extLst>
-            </p:cNvPr>
-            <p:cNvSpPr txBox="1"/>
-            <p:nvPr/>
-          </p:nvSpPr>
-          <p:spPr>
-            <a:xfrm>
-              <a:off x="5734050" y="1714500"/>
-              <a:ext cx="1720850" cy="646331"/>
-            </a:xfrm>
-            <a:prstGeom prst="rect">
-              <a:avLst/>
-            </a:prstGeom>
-            <a:noFill/>
-          </p:spPr>
-          <p:txBody>
-            <a:bodyPr wrap="square" rtlCol="1">
-              <a:spAutoFit/>
-            </a:bodyPr>
-            <a:lstStyle/>
-            <a:p>
-              <a:r>
-                <a:rPr lang="en-US" dirty="0"/>
-                <a:t>In-Page Reaction</a:t>
-              </a:r>
-              <a:endParaRPr lang="he-IL" dirty="0"/>
-            </a:p>
-          </p:txBody>
-        </p:sp>
-        <p:sp>
-          <p:nvSpPr>
-            <p:cNvPr id="11" name="TextBox 10">
-              <a:extLst>
-                <a:ext uri="{FF2B5EF4-FFF2-40B4-BE49-F238E27FC236}">
-                  <a16:creationId xmlns:a16="http://schemas.microsoft.com/office/drawing/2014/main" id="{83910B02-D8B2-C4C1-2FED-91E0CD845B95}"/>
-                </a:ext>
-              </a:extLst>
-            </p:cNvPr>
-            <p:cNvSpPr txBox="1"/>
-            <p:nvPr/>
-          </p:nvSpPr>
-          <p:spPr>
-            <a:xfrm>
-              <a:off x="5727700" y="2350184"/>
-              <a:ext cx="1720850" cy="646331"/>
-            </a:xfrm>
-            <a:prstGeom prst="rect">
-              <a:avLst/>
-            </a:prstGeom>
-            <a:noFill/>
-          </p:spPr>
-          <p:txBody>
-            <a:bodyPr wrap="square" rtlCol="1">
-              <a:spAutoFit/>
-            </a:bodyPr>
-            <a:lstStyle/>
-            <a:p>
-              <a:r>
-                <a:rPr lang="en-US" dirty="0"/>
-                <a:t>Database Interaction</a:t>
-              </a:r>
-              <a:endParaRPr lang="he-IL" dirty="0"/>
-            </a:p>
-          </p:txBody>
-        </p:sp>
-      </p:grpSp>
+          </a:ln>
+        </p:spPr>
+      </p:pic>
     </p:spTree>
     <p:extLst>
       <p:ext uri="{BB962C8B-B14F-4D97-AF65-F5344CB8AC3E}">

</xml_diff>

<commit_message>
Update for Part A
</commit_message>
<xml_diff>
--- a/PowerPoints/WireFrames.pptx
+++ b/PowerPoints/WireFrames.pptx
@@ -2216,7 +2216,7 @@
           <a:p>
             <a:fld id="{59AD6ED2-06E5-413B-A705-7AEAA10694DC}" type="datetimeFigureOut">
               <a:rPr lang="he-IL" smtClean="0"/>
-              <a:t>כ"ד/אב/תשפ"ב</a:t>
+              <a:t>כ"ח/אב/תשפ"ב</a:t>
             </a:fld>
             <a:endParaRPr lang="he-IL"/>
           </a:p>
@@ -2416,7 +2416,7 @@
           <a:p>
             <a:fld id="{59AD6ED2-06E5-413B-A705-7AEAA10694DC}" type="datetimeFigureOut">
               <a:rPr lang="he-IL" smtClean="0"/>
-              <a:t>כ"ד/אב/תשפ"ב</a:t>
+              <a:t>כ"ח/אב/תשפ"ב</a:t>
             </a:fld>
             <a:endParaRPr lang="he-IL"/>
           </a:p>
@@ -2626,7 +2626,7 @@
           <a:p>
             <a:fld id="{59AD6ED2-06E5-413B-A705-7AEAA10694DC}" type="datetimeFigureOut">
               <a:rPr lang="he-IL" smtClean="0"/>
-              <a:t>כ"ד/אב/תשפ"ב</a:t>
+              <a:t>כ"ח/אב/תשפ"ב</a:t>
             </a:fld>
             <a:endParaRPr lang="he-IL"/>
           </a:p>
@@ -2826,7 +2826,7 @@
           <a:p>
             <a:fld id="{59AD6ED2-06E5-413B-A705-7AEAA10694DC}" type="datetimeFigureOut">
               <a:rPr lang="he-IL" smtClean="0"/>
-              <a:t>כ"ד/אב/תשפ"ב</a:t>
+              <a:t>כ"ח/אב/תשפ"ב</a:t>
             </a:fld>
             <a:endParaRPr lang="he-IL"/>
           </a:p>
@@ -3102,7 +3102,7 @@
           <a:p>
             <a:fld id="{59AD6ED2-06E5-413B-A705-7AEAA10694DC}" type="datetimeFigureOut">
               <a:rPr lang="he-IL" smtClean="0"/>
-              <a:t>כ"ד/אב/תשפ"ב</a:t>
+              <a:t>כ"ח/אב/תשפ"ב</a:t>
             </a:fld>
             <a:endParaRPr lang="he-IL"/>
           </a:p>
@@ -3370,7 +3370,7 @@
           <a:p>
             <a:fld id="{59AD6ED2-06E5-413B-A705-7AEAA10694DC}" type="datetimeFigureOut">
               <a:rPr lang="he-IL" smtClean="0"/>
-              <a:t>כ"ד/אב/תשפ"ב</a:t>
+              <a:t>כ"ח/אב/תשפ"ב</a:t>
             </a:fld>
             <a:endParaRPr lang="he-IL"/>
           </a:p>
@@ -3785,7 +3785,7 @@
           <a:p>
             <a:fld id="{59AD6ED2-06E5-413B-A705-7AEAA10694DC}" type="datetimeFigureOut">
               <a:rPr lang="he-IL" smtClean="0"/>
-              <a:t>כ"ד/אב/תשפ"ב</a:t>
+              <a:t>כ"ח/אב/תשפ"ב</a:t>
             </a:fld>
             <a:endParaRPr lang="he-IL"/>
           </a:p>
@@ -3927,7 +3927,7 @@
           <a:p>
             <a:fld id="{59AD6ED2-06E5-413B-A705-7AEAA10694DC}" type="datetimeFigureOut">
               <a:rPr lang="he-IL" smtClean="0"/>
-              <a:t>כ"ד/אב/תשפ"ב</a:t>
+              <a:t>כ"ח/אב/תשפ"ב</a:t>
             </a:fld>
             <a:endParaRPr lang="he-IL"/>
           </a:p>
@@ -4040,7 +4040,7 @@
           <a:p>
             <a:fld id="{59AD6ED2-06E5-413B-A705-7AEAA10694DC}" type="datetimeFigureOut">
               <a:rPr lang="he-IL" smtClean="0"/>
-              <a:t>כ"ד/אב/תשפ"ב</a:t>
+              <a:t>כ"ח/אב/תשפ"ב</a:t>
             </a:fld>
             <a:endParaRPr lang="he-IL"/>
           </a:p>
@@ -4353,7 +4353,7 @@
           <a:p>
             <a:fld id="{59AD6ED2-06E5-413B-A705-7AEAA10694DC}" type="datetimeFigureOut">
               <a:rPr lang="he-IL" smtClean="0"/>
-              <a:t>כ"ד/אב/תשפ"ב</a:t>
+              <a:t>כ"ח/אב/תשפ"ב</a:t>
             </a:fld>
             <a:endParaRPr lang="he-IL"/>
           </a:p>
@@ -4642,7 +4642,7 @@
           <a:p>
             <a:fld id="{59AD6ED2-06E5-413B-A705-7AEAA10694DC}" type="datetimeFigureOut">
               <a:rPr lang="he-IL" smtClean="0"/>
-              <a:t>כ"ד/אב/תשפ"ב</a:t>
+              <a:t>כ"ח/אב/תשפ"ב</a:t>
             </a:fld>
             <a:endParaRPr lang="he-IL"/>
           </a:p>
@@ -4885,7 +4885,7 @@
           <a:p>
             <a:fld id="{59AD6ED2-06E5-413B-A705-7AEAA10694DC}" type="datetimeFigureOut">
               <a:rPr lang="he-IL" smtClean="0"/>
-              <a:t>כ"ד/אב/תשפ"ב</a:t>
+              <a:t>כ"ח/אב/תשפ"ב</a:t>
             </a:fld>
             <a:endParaRPr lang="he-IL"/>
           </a:p>
@@ -6120,8 +6120,8 @@
         </p:nvSpPr>
         <p:spPr>
           <a:xfrm>
-            <a:off x="6362700" y="1626973"/>
-            <a:ext cx="4024113" cy="5074663"/>
+            <a:off x="6362701" y="2886077"/>
+            <a:ext cx="3825240" cy="3825446"/>
           </a:xfrm>
           <a:prstGeom prst="roundRect">
             <a:avLst/>
@@ -6173,10 +6173,10 @@
         </p:nvGrpSpPr>
         <p:grpSpPr>
           <a:xfrm>
-            <a:off x="6858753" y="1743715"/>
-            <a:ext cx="3215640" cy="4440144"/>
+            <a:off x="6876157" y="3108808"/>
+            <a:ext cx="3215640" cy="3886146"/>
             <a:chOff x="6736080" y="2073471"/>
-            <a:chExt cx="3215640" cy="4440144"/>
+            <a:chExt cx="3215640" cy="3886146"/>
           </a:xfrm>
         </p:grpSpPr>
         <p:sp>
@@ -6238,9 +6238,9 @@
           <p:grpSpPr>
             <a:xfrm>
               <a:off x="6736080" y="2786333"/>
-              <a:ext cx="3215640" cy="3727282"/>
+              <a:ext cx="3215640" cy="3173284"/>
               <a:chOff x="6736080" y="2786333"/>
-              <a:chExt cx="3215640" cy="3727282"/>
+              <a:chExt cx="3215640" cy="3173284"/>
             </a:xfrm>
           </p:grpSpPr>
           <p:sp>
@@ -6401,7 +6401,7 @@
             <p:spPr>
               <a:xfrm>
                 <a:off x="8300720" y="3824124"/>
-                <a:ext cx="1087120" cy="373072"/>
+                <a:ext cx="1087120" cy="646331"/>
               </a:xfrm>
               <a:prstGeom prst="rect">
                 <a:avLst/>
@@ -6417,7 +6417,7 @@
                 <a:pPr algn="ctr"/>
                 <a:r>
                   <a:rPr lang="en-US" dirty="0"/>
-                  <a:t>Name</a:t>
+                  <a:t>Full Name</a:t>
                 </a:r>
                 <a:endParaRPr lang="he-IL" dirty="0"/>
               </a:p>
@@ -6452,64 +6452,7 @@
               <a:lstStyle/>
               <a:p>
                 <a:pPr algn="ctr"/>
-                <a:r>
-                  <a:rPr lang="en-US" dirty="0"/>
-                  <a:t>Last Name</a:t>
-                </a:r>
                 <a:endParaRPr lang="he-IL" dirty="0"/>
-              </a:p>
-            </p:txBody>
-          </p:sp>
-          <p:sp>
-            <p:nvSpPr>
-              <p:cNvPr id="16" name="Rectangle: Rounded Corners 15">
-                <a:extLst>
-                  <a:ext uri="{FF2B5EF4-FFF2-40B4-BE49-F238E27FC236}">
-                    <a16:creationId xmlns:a16="http://schemas.microsoft.com/office/drawing/2014/main" id="{1A1A18A5-D6BD-A5EB-DD66-17D2AA722C14}"/>
-                  </a:ext>
-                </a:extLst>
-              </p:cNvPr>
-              <p:cNvSpPr/>
-              <p:nvPr/>
-            </p:nvSpPr>
-            <p:spPr>
-              <a:xfrm>
-                <a:off x="6736080" y="4310045"/>
-                <a:ext cx="1564640" cy="421640"/>
-              </a:xfrm>
-              <a:prstGeom prst="roundRect">
-                <a:avLst/>
-              </a:prstGeom>
-              <a:solidFill>
-                <a:schemeClr val="accent2">
-                  <a:lumMod val="20000"/>
-                  <a:lumOff val="80000"/>
-                  <a:alpha val="71000"/>
-                </a:schemeClr>
-              </a:solidFill>
-            </p:spPr>
-            <p:style>
-              <a:lnRef idx="2">
-                <a:schemeClr val="accent1">
-                  <a:shade val="50000"/>
-                </a:schemeClr>
-              </a:lnRef>
-              <a:fillRef idx="1">
-                <a:schemeClr val="accent1"/>
-              </a:fillRef>
-              <a:effectRef idx="0">
-                <a:schemeClr val="accent1"/>
-              </a:effectRef>
-              <a:fontRef idx="minor">
-                <a:schemeClr val="lt1"/>
-              </a:fontRef>
-            </p:style>
-            <p:txBody>
-              <a:bodyPr rtlCol="1" anchor="ctr"/>
-              <a:lstStyle/>
-              <a:p>
-                <a:pPr algn="ctr"/>
-                <a:endParaRPr lang="he-IL"/>
               </a:p>
             </p:txBody>
           </p:sp>
@@ -6528,7 +6471,7 @@
             <p:spPr>
               <a:xfrm>
                 <a:off x="8321040" y="4914452"/>
-                <a:ext cx="1534160" cy="646331"/>
+                <a:ext cx="1534160" cy="369332"/>
               </a:xfrm>
               <a:prstGeom prst="rect">
                 <a:avLst/>
@@ -6542,117 +6485,7 @@
               <a:lstStyle/>
               <a:p>
                 <a:pPr algn="ctr"/>
-                <a:r>
-                  <a:rPr lang="en-US" dirty="0"/>
-                  <a:t>Max Climbing Grade</a:t>
-                </a:r>
                 <a:endParaRPr lang="he-IL" dirty="0"/>
-              </a:p>
-            </p:txBody>
-          </p:sp>
-          <p:sp>
-            <p:nvSpPr>
-              <p:cNvPr id="18" name="Rectangle: Rounded Corners 17">
-                <a:extLst>
-                  <a:ext uri="{FF2B5EF4-FFF2-40B4-BE49-F238E27FC236}">
-                    <a16:creationId xmlns:a16="http://schemas.microsoft.com/office/drawing/2014/main" id="{D5CDE9FE-5CBF-65DE-AF78-0037D14C6109}"/>
-                  </a:ext>
-                </a:extLst>
-              </p:cNvPr>
-              <p:cNvSpPr/>
-              <p:nvPr/>
-            </p:nvSpPr>
-            <p:spPr>
-              <a:xfrm>
-                <a:off x="6756400" y="4992441"/>
-                <a:ext cx="1564640" cy="421640"/>
-              </a:xfrm>
-              <a:prstGeom prst="roundRect">
-                <a:avLst/>
-              </a:prstGeom>
-              <a:solidFill>
-                <a:schemeClr val="accent2">
-                  <a:lumMod val="20000"/>
-                  <a:lumOff val="80000"/>
-                  <a:alpha val="71000"/>
-                </a:schemeClr>
-              </a:solidFill>
-            </p:spPr>
-            <p:style>
-              <a:lnRef idx="2">
-                <a:schemeClr val="accent1">
-                  <a:shade val="50000"/>
-                </a:schemeClr>
-              </a:lnRef>
-              <a:fillRef idx="1">
-                <a:schemeClr val="accent1"/>
-              </a:fillRef>
-              <a:effectRef idx="0">
-                <a:schemeClr val="accent1"/>
-              </a:effectRef>
-              <a:fontRef idx="minor">
-                <a:schemeClr val="lt1"/>
-              </a:fontRef>
-            </p:style>
-            <p:txBody>
-              <a:bodyPr rtlCol="1" anchor="ctr"/>
-              <a:lstStyle/>
-              <a:p>
-                <a:pPr algn="ctr"/>
-                <a:endParaRPr lang="he-IL"/>
-              </a:p>
-            </p:txBody>
-          </p:sp>
-          <p:sp>
-            <p:nvSpPr>
-              <p:cNvPr id="19" name="Rectangle: Rounded Corners 18">
-                <a:extLst>
-                  <a:ext uri="{FF2B5EF4-FFF2-40B4-BE49-F238E27FC236}">
-                    <a16:creationId xmlns:a16="http://schemas.microsoft.com/office/drawing/2014/main" id="{62EBA766-FD11-D137-10A1-E68901CDA772}"/>
-                  </a:ext>
-                </a:extLst>
-              </p:cNvPr>
-              <p:cNvSpPr/>
-              <p:nvPr/>
-            </p:nvSpPr>
-            <p:spPr>
-              <a:xfrm>
-                <a:off x="6756400" y="5674837"/>
-                <a:ext cx="1564640" cy="421640"/>
-              </a:xfrm>
-              <a:prstGeom prst="roundRect">
-                <a:avLst/>
-              </a:prstGeom>
-              <a:solidFill>
-                <a:schemeClr val="accent2">
-                  <a:lumMod val="20000"/>
-                  <a:lumOff val="80000"/>
-                  <a:alpha val="71000"/>
-                </a:schemeClr>
-              </a:solidFill>
-            </p:spPr>
-            <p:style>
-              <a:lnRef idx="2">
-                <a:schemeClr val="accent1">
-                  <a:shade val="50000"/>
-                </a:schemeClr>
-              </a:lnRef>
-              <a:fillRef idx="1">
-                <a:schemeClr val="accent1"/>
-              </a:fillRef>
-              <a:effectRef idx="0">
-                <a:schemeClr val="accent1"/>
-              </a:effectRef>
-              <a:fontRef idx="minor">
-                <a:schemeClr val="lt1"/>
-              </a:fontRef>
-            </p:style>
-            <p:txBody>
-              <a:bodyPr rtlCol="1" anchor="ctr"/>
-              <a:lstStyle/>
-              <a:p>
-                <a:pPr algn="ctr"/>
-                <a:endParaRPr lang="he-IL"/>
               </a:p>
             </p:txBody>
           </p:sp>
@@ -6671,7 +6504,7 @@
             <p:spPr>
               <a:xfrm>
                 <a:off x="8417560" y="5590285"/>
-                <a:ext cx="1534160" cy="923330"/>
+                <a:ext cx="1534160" cy="369332"/>
               </a:xfrm>
               <a:prstGeom prst="rect">
                 <a:avLst/>
@@ -6685,132 +6518,10 @@
               <a:lstStyle/>
               <a:p>
                 <a:pPr algn="ctr"/>
-                <a:r>
-                  <a:rPr lang="en-US" dirty="0"/>
-                  <a:t>Type of max Strength Holds</a:t>
-                </a:r>
                 <a:endParaRPr lang="he-IL" dirty="0"/>
               </a:p>
             </p:txBody>
           </p:sp>
-          <p:pic>
-            <p:nvPicPr>
-              <p:cNvPr id="1028" name="Picture 4" descr="Drop, down, list Icon in Icon Park">
-                <a:extLst>
-                  <a:ext uri="{FF2B5EF4-FFF2-40B4-BE49-F238E27FC236}">
-                    <a16:creationId xmlns:a16="http://schemas.microsoft.com/office/drawing/2014/main" id="{A768F446-1EEC-2414-47F2-CBC399534EF1}"/>
-                  </a:ext>
-                </a:extLst>
-              </p:cNvPr>
-              <p:cNvPicPr>
-                <a:picLocks noChangeAspect="1" noChangeArrowheads="1"/>
-              </p:cNvPicPr>
-              <p:nvPr/>
-            </p:nvPicPr>
-            <p:blipFill>
-              <a:blip r:embed="rId3">
-                <a:extLst>
-                  <a:ext uri="{BEBA8EAE-BF5A-486C-A8C5-ECC9F3942E4B}">
-                    <a14:imgProps xmlns:a14="http://schemas.microsoft.com/office/drawing/2010/main">
-                      <a14:imgLayer r:embed="rId4">
-                        <a14:imgEffect>
-                          <a14:backgroundRemoval t="3556" b="92444" l="9778" r="89778">
-                            <a14:foregroundMark x1="68889" y1="37778" x2="68889" y2="37778"/>
-                            <a14:foregroundMark x1="68444" y1="20444" x2="68444" y2="20444"/>
-                          </a14:backgroundRemoval>
-                        </a14:imgEffect>
-                      </a14:imgLayer>
-                    </a14:imgProps>
-                  </a:ext>
-                  <a:ext uri="{28A0092B-C50C-407E-A947-70E740481C1C}">
-                    <a14:useLocalDpi xmlns:a14="http://schemas.microsoft.com/office/drawing/2010/main" val="0"/>
-                  </a:ext>
-                </a:extLst>
-              </a:blip>
-              <a:srcRect/>
-              <a:stretch>
-                <a:fillRect/>
-              </a:stretch>
-            </p:blipFill>
-            <p:spPr bwMode="auto">
-              <a:xfrm>
-                <a:off x="7887177" y="5035398"/>
-                <a:ext cx="413543" cy="413543"/>
-              </a:xfrm>
-              <a:prstGeom prst="rect">
-                <a:avLst/>
-              </a:prstGeom>
-              <a:noFill/>
-              <a:extLst>
-                <a:ext uri="{909E8E84-426E-40DD-AFC4-6F175D3DCCD1}">
-                  <a14:hiddenFill xmlns:a14="http://schemas.microsoft.com/office/drawing/2010/main">
-                    <a:solidFill>
-                      <a:srgbClr val="FFFFFF"/>
-                    </a:solidFill>
-                  </a14:hiddenFill>
-                </a:ext>
-              </a:extLst>
-            </p:spPr>
-          </p:pic>
-          <p:pic>
-            <p:nvPicPr>
-              <p:cNvPr id="21" name="Picture 4" descr="Drop, down, list Icon in Icon Park">
-                <a:extLst>
-                  <a:ext uri="{FF2B5EF4-FFF2-40B4-BE49-F238E27FC236}">
-                    <a16:creationId xmlns:a16="http://schemas.microsoft.com/office/drawing/2014/main" id="{9EACC6ED-EF11-D684-7659-BF50E2B71BF3}"/>
-                  </a:ext>
-                </a:extLst>
-              </p:cNvPr>
-              <p:cNvPicPr>
-                <a:picLocks noChangeAspect="1" noChangeArrowheads="1"/>
-              </p:cNvPicPr>
-              <p:nvPr/>
-            </p:nvPicPr>
-            <p:blipFill>
-              <a:blip r:embed="rId3">
-                <a:extLst>
-                  <a:ext uri="{BEBA8EAE-BF5A-486C-A8C5-ECC9F3942E4B}">
-                    <a14:imgProps xmlns:a14="http://schemas.microsoft.com/office/drawing/2010/main">
-                      <a14:imgLayer r:embed="rId4">
-                        <a14:imgEffect>
-                          <a14:backgroundRemoval t="3556" b="92444" l="9778" r="89778">
-                            <a14:foregroundMark x1="68889" y1="37778" x2="68889" y2="37778"/>
-                            <a14:foregroundMark x1="68444" y1="20444" x2="68444" y2="20444"/>
-                          </a14:backgroundRemoval>
-                        </a14:imgEffect>
-                      </a14:imgLayer>
-                    </a14:imgProps>
-                  </a:ext>
-                  <a:ext uri="{28A0092B-C50C-407E-A947-70E740481C1C}">
-                    <a14:useLocalDpi xmlns:a14="http://schemas.microsoft.com/office/drawing/2010/main" val="0"/>
-                  </a:ext>
-                </a:extLst>
-              </a:blip>
-              <a:srcRect/>
-              <a:stretch>
-                <a:fillRect/>
-              </a:stretch>
-            </p:blipFill>
-            <p:spPr bwMode="auto">
-              <a:xfrm>
-                <a:off x="7887177" y="5705456"/>
-                <a:ext cx="413543" cy="413543"/>
-              </a:xfrm>
-              <a:prstGeom prst="rect">
-                <a:avLst/>
-              </a:prstGeom>
-              <a:noFill/>
-              <a:extLst>
-                <a:ext uri="{909E8E84-426E-40DD-AFC4-6F175D3DCCD1}">
-                  <a14:hiddenFill xmlns:a14="http://schemas.microsoft.com/office/drawing/2010/main">
-                    <a:solidFill>
-                      <a:srgbClr val="FFFFFF"/>
-                    </a:solidFill>
-                  </a14:hiddenFill>
-                </a:ext>
-              </a:extLst>
-            </p:spPr>
-          </p:pic>
         </p:grpSp>
       </p:grpSp>
       <p:cxnSp>
@@ -7311,7 +7022,7 @@
         </p:nvSpPr>
         <p:spPr>
           <a:xfrm>
-            <a:off x="8529320" y="3019166"/>
+            <a:off x="8480168" y="4379316"/>
             <a:ext cx="1087120" cy="373072"/>
           </a:xfrm>
           <a:prstGeom prst="rect">
@@ -7348,7 +7059,7 @@
         </p:nvSpPr>
         <p:spPr>
           <a:xfrm>
-            <a:off x="6876157" y="2953802"/>
+            <a:off x="6876157" y="4325478"/>
             <a:ext cx="1564640" cy="421640"/>
           </a:xfrm>
           <a:prstGeom prst="roundRect">
@@ -9582,56 +9293,6 @@
           <a:chExt cx="0" cy="0"/>
         </a:xfrm>
       </p:grpSpPr>
-      <p:pic>
-        <p:nvPicPr>
-          <p:cNvPr id="2" name="Picture 1">
-            <a:extLst>
-              <a:ext uri="{FF2B5EF4-FFF2-40B4-BE49-F238E27FC236}">
-                <a16:creationId xmlns:a16="http://schemas.microsoft.com/office/drawing/2014/main" id="{2EAB1266-063A-1052-784C-4C6C91DD8F80}"/>
-              </a:ext>
-            </a:extLst>
-          </p:cNvPr>
-          <p:cNvPicPr>
-            <a:picLocks noChangeAspect="1"/>
-          </p:cNvPicPr>
-          <p:nvPr/>
-        </p:nvPicPr>
-        <p:blipFill>
-          <a:blip r:embed="rId2">
-            <a:extLst>
-              <a:ext uri="{BEBA8EAE-BF5A-486C-A8C5-ECC9F3942E4B}">
-                <a14:imgProps xmlns:a14="http://schemas.microsoft.com/office/drawing/2010/main">
-                  <a14:imgLayer r:embed="rId3">
-                    <a14:imgEffect>
-                      <a14:backgroundRemoval t="10000" b="90000" l="5417" r="96607"/>
-                    </a14:imgEffect>
-                  </a14:imgLayer>
-                </a14:imgProps>
-              </a:ext>
-              <a:ext uri="{28A0092B-C50C-407E-A947-70E740481C1C}">
-                <a14:useLocalDpi xmlns:a14="http://schemas.microsoft.com/office/drawing/2010/main" val="0"/>
-              </a:ext>
-            </a:extLst>
-          </a:blip>
-          <a:srcRect/>
-          <a:stretch>
-            <a:fillRect/>
-          </a:stretch>
-        </p:blipFill>
-        <p:spPr bwMode="auto">
-          <a:xfrm>
-            <a:off x="-442913" y="-681991"/>
-            <a:ext cx="13077825" cy="9643890"/>
-          </a:xfrm>
-          <a:prstGeom prst="rect">
-            <a:avLst/>
-          </a:prstGeom>
-          <a:noFill/>
-          <a:ln>
-            <a:noFill/>
-          </a:ln>
-        </p:spPr>
-      </p:pic>
     </p:spTree>
     <p:extLst>
       <p:ext uri="{BB962C8B-B14F-4D97-AF65-F5344CB8AC3E}">

</xml_diff>